<commit_message>
like it was presented.
</commit_message>
<xml_diff>
--- a/Documents/Task 7/Task 7.pptx
+++ b/Documents/Task 7/Task 7.pptx
@@ -735,7 +735,7 @@
           <a:p>
             <a:fld id="{47B9CC14-C19A-4133-BA5B-215623135375}" type="datetimeFigureOut">
               <a:rPr lang="de-CH" smtClean="0"/>
-              <a:t>11.11.2015</a:t>
+              <a:t>12.11.2015</a:t>
             </a:fld>
             <a:endParaRPr lang="de-CH"/>
           </a:p>
@@ -931,7 +931,7 @@
           <a:p>
             <a:fld id="{47B9CC14-C19A-4133-BA5B-215623135375}" type="datetimeFigureOut">
               <a:rPr lang="de-CH" smtClean="0"/>
-              <a:t>11.11.2015</a:t>
+              <a:t>12.11.2015</a:t>
             </a:fld>
             <a:endParaRPr lang="de-CH"/>
           </a:p>
@@ -1116,7 +1116,7 @@
           <a:p>
             <a:fld id="{47B9CC14-C19A-4133-BA5B-215623135375}" type="datetimeFigureOut">
               <a:rPr lang="de-CH" smtClean="0"/>
-              <a:t>11.11.2015</a:t>
+              <a:t>12.11.2015</a:t>
             </a:fld>
             <a:endParaRPr lang="de-CH"/>
           </a:p>
@@ -1266,7 +1266,7 @@
           <a:p>
             <a:fld id="{47B9CC14-C19A-4133-BA5B-215623135375}" type="datetimeFigureOut">
               <a:rPr lang="de-CH" smtClean="0"/>
-              <a:t>11.11.2015</a:t>
+              <a:t>12.11.2015</a:t>
             </a:fld>
             <a:endParaRPr lang="de-CH"/>
           </a:p>
@@ -1521,7 +1521,7 @@
           <a:p>
             <a:fld id="{47B9CC14-C19A-4133-BA5B-215623135375}" type="datetimeFigureOut">
               <a:rPr lang="de-CH" smtClean="0"/>
-              <a:t>11.11.2015</a:t>
+              <a:t>12.11.2015</a:t>
             </a:fld>
             <a:endParaRPr lang="de-CH"/>
           </a:p>
@@ -1930,7 +1930,7 @@
           <a:p>
             <a:fld id="{47B9CC14-C19A-4133-BA5B-215623135375}" type="datetimeFigureOut">
               <a:rPr lang="de-CH" smtClean="0"/>
-              <a:t>11.11.2015</a:t>
+              <a:t>12.11.2015</a:t>
             </a:fld>
             <a:endParaRPr lang="de-CH"/>
           </a:p>
@@ -2376,7 +2376,7 @@
           <a:p>
             <a:fld id="{47B9CC14-C19A-4133-BA5B-215623135375}" type="datetimeFigureOut">
               <a:rPr lang="de-CH" smtClean="0"/>
-              <a:t>11.11.2015</a:t>
+              <a:t>12.11.2015</a:t>
             </a:fld>
             <a:endParaRPr lang="de-CH"/>
           </a:p>
@@ -2477,7 +2477,7 @@
           <a:p>
             <a:fld id="{47B9CC14-C19A-4133-BA5B-215623135375}" type="datetimeFigureOut">
               <a:rPr lang="de-CH" smtClean="0"/>
-              <a:t>11.11.2015</a:t>
+              <a:t>12.11.2015</a:t>
             </a:fld>
             <a:endParaRPr lang="de-CH"/>
           </a:p>
@@ -2598,7 +2598,7 @@
           <a:p>
             <a:fld id="{47B9CC14-C19A-4133-BA5B-215623135375}" type="datetimeFigureOut">
               <a:rPr lang="de-CH" smtClean="0"/>
-              <a:t>11.11.2015</a:t>
+              <a:t>12.11.2015</a:t>
             </a:fld>
             <a:endParaRPr lang="de-CH"/>
           </a:p>
@@ -2872,7 +2872,7 @@
           <a:p>
             <a:fld id="{47B9CC14-C19A-4133-BA5B-215623135375}" type="datetimeFigureOut">
               <a:rPr lang="de-CH" smtClean="0"/>
-              <a:t>11.11.2015</a:t>
+              <a:t>12.11.2015</a:t>
             </a:fld>
             <a:endParaRPr lang="de-CH"/>
           </a:p>
@@ -3077,7 +3077,7 @@
           <a:p>
             <a:fld id="{47B9CC14-C19A-4133-BA5B-215623135375}" type="datetimeFigureOut">
               <a:rPr lang="de-CH" smtClean="0"/>
-              <a:t>11.11.2015</a:t>
+              <a:t>12.11.2015</a:t>
             </a:fld>
             <a:endParaRPr lang="de-CH"/>
           </a:p>
@@ -4186,7 +4186,7 @@
           <a:p>
             <a:fld id="{47B9CC14-C19A-4133-BA5B-215623135375}" type="datetimeFigureOut">
               <a:rPr lang="de-CH" smtClean="0"/>
-              <a:t>11.11.2015</a:t>
+              <a:t>12.11.2015</a:t>
             </a:fld>
             <a:endParaRPr lang="de-CH"/>
           </a:p>
@@ -4707,7 +4707,7 @@
           <a:bodyPr/>
           <a:lstStyle/>
           <a:p>
-            <a:endParaRPr lang="de-CH"/>
+            <a:endParaRPr lang="de-CH" dirty="0"/>
           </a:p>
         </p:txBody>
       </p:sp>
@@ -4761,7 +4761,7 @@
         </p:blipFill>
         <p:spPr bwMode="auto">
           <a:xfrm>
-            <a:off x="467544" y="1196752"/>
+            <a:off x="683568" y="1227525"/>
             <a:ext cx="7823200" cy="5473700"/>
           </a:xfrm>
           <a:prstGeom prst="rect">
@@ -4893,8 +4893,8 @@
         </p:blipFill>
         <p:spPr bwMode="auto">
           <a:xfrm>
-            <a:off x="1043607" y="1268760"/>
-            <a:ext cx="7126727" cy="4669235"/>
+            <a:off x="395536" y="1268759"/>
+            <a:ext cx="8352928" cy="5472608"/>
           </a:xfrm>
           <a:prstGeom prst="rect">
             <a:avLst/>
@@ -5025,8 +5025,8 @@
         </p:blipFill>
         <p:spPr bwMode="auto">
           <a:xfrm>
-            <a:off x="1283795" y="1390068"/>
-            <a:ext cx="6904340" cy="4679294"/>
+            <a:off x="539552" y="1196753"/>
+            <a:ext cx="7918086" cy="5366342"/>
           </a:xfrm>
           <a:prstGeom prst="rect">
             <a:avLst/>

</xml_diff>